<commit_message>
Updating references to rx3
</commit_message>
<xml_diff>
--- a/RxInAction.pptx
+++ b/RxInAction.pptx
@@ -227,7 +227,7 @@
           <a:p>
             <a:fld id="{FC81B089-160E-404A-8C73-8674F1782EA4}" type="datetimeFigureOut">
               <a:rPr lang="en-US" smtClean="0"/>
-              <a:t>8/9/2014</a:t>
+              <a:t>2/1/2015</a:t>
             </a:fld>
             <a:endParaRPr lang="en-US"/>
           </a:p>
@@ -567,7 +567,7 @@
           <a:p>
             <a:fld id="{CF705FED-B5F1-4160-8902-27DBE1B04A6A}" type="datetime1">
               <a:rPr lang="en-US" smtClean="0"/>
-              <a:t>8/9/2014</a:t>
+              <a:t>2/1/2015</a:t>
             </a:fld>
             <a:endParaRPr lang="en-US" dirty="0"/>
           </a:p>
@@ -3495,7 +3495,7 @@
           <a:p>
             <a:fld id="{D2B62928-2648-4210-B25C-2BD7B5FE2C7B}" type="datetimeFigureOut">
               <a:rPr lang="en-US" smtClean="0"/>
-              <a:t>8/9/2014</a:t>
+              <a:t>2/1/2015</a:t>
             </a:fld>
             <a:endParaRPr lang="en-US"/>
           </a:p>
@@ -4008,7 +4008,7 @@
           <a:p>
             <a:fld id="{D2B62928-2648-4210-B25C-2BD7B5FE2C7B}" type="datetimeFigureOut">
               <a:rPr lang="en-US" smtClean="0"/>
-              <a:t>8/9/2014</a:t>
+              <a:t>2/1/2015</a:t>
             </a:fld>
             <a:endParaRPr lang="en-US"/>
           </a:p>
@@ -4183,7 +4183,7 @@
           <a:p>
             <a:fld id="{D2B62928-2648-4210-B25C-2BD7B5FE2C7B}" type="datetimeFigureOut">
               <a:rPr lang="en-US" smtClean="0"/>
-              <a:t>8/9/2014</a:t>
+              <a:t>2/1/2015</a:t>
             </a:fld>
             <a:endParaRPr lang="en-US"/>
           </a:p>
@@ -4573,7 +4573,7 @@
           <a:p>
             <a:fld id="{D2B62928-2648-4210-B25C-2BD7B5FE2C7B}" type="datetimeFigureOut">
               <a:rPr lang="en-US" smtClean="0"/>
-              <a:t>8/9/2014</a:t>
+              <a:t>2/1/2015</a:t>
             </a:fld>
             <a:endParaRPr lang="en-US"/>
           </a:p>
@@ -7697,7 +7697,7 @@
           <a:p>
             <a:fld id="{D2B62928-2648-4210-B25C-2BD7B5FE2C7B}" type="datetimeFigureOut">
               <a:rPr lang="en-US" smtClean="0"/>
-              <a:t>8/9/2014</a:t>
+              <a:t>2/1/2015</a:t>
             </a:fld>
             <a:endParaRPr lang="en-US"/>
           </a:p>
@@ -7980,7 +7980,7 @@
           <a:p>
             <a:fld id="{D2B62928-2648-4210-B25C-2BD7B5FE2C7B}" type="datetimeFigureOut">
               <a:rPr lang="en-US" smtClean="0"/>
-              <a:t>8/9/2014</a:t>
+              <a:t>2/1/2015</a:t>
             </a:fld>
             <a:endParaRPr lang="en-US"/>
           </a:p>
@@ -8397,7 +8397,7 @@
           <a:p>
             <a:fld id="{D2B62928-2648-4210-B25C-2BD7B5FE2C7B}" type="datetimeFigureOut">
               <a:rPr lang="en-US" smtClean="0"/>
-              <a:t>8/9/2014</a:t>
+              <a:t>2/1/2015</a:t>
             </a:fld>
             <a:endParaRPr lang="en-US"/>
           </a:p>
@@ -8510,7 +8510,7 @@
           <a:p>
             <a:fld id="{D2B62928-2648-4210-B25C-2BD7B5FE2C7B}" type="datetimeFigureOut">
               <a:rPr lang="en-US" smtClean="0"/>
-              <a:t>8/9/2014</a:t>
+              <a:t>2/1/2015</a:t>
             </a:fld>
             <a:endParaRPr lang="en-US"/>
           </a:p>
@@ -8600,7 +8600,7 @@
           <a:p>
             <a:fld id="{D2B62928-2648-4210-B25C-2BD7B5FE2C7B}" type="datetimeFigureOut">
               <a:rPr lang="en-US" smtClean="0"/>
-              <a:t>8/9/2014</a:t>
+              <a:t>2/1/2015</a:t>
             </a:fld>
             <a:endParaRPr lang="en-US"/>
           </a:p>
@@ -8775,7 +8775,7 @@
           <a:p>
             <a:fld id="{D2B62928-2648-4210-B25C-2BD7B5FE2C7B}" type="datetimeFigureOut">
               <a:rPr lang="en-US" smtClean="0"/>
-              <a:t>8/9/2014</a:t>
+              <a:t>2/1/2015</a:t>
             </a:fld>
             <a:endParaRPr lang="en-US"/>
           </a:p>
@@ -9261,7 +9261,7 @@
           <a:p>
             <a:fld id="{D2B62928-2648-4210-B25C-2BD7B5FE2C7B}" type="datetimeFigureOut">
               <a:rPr lang="en-US" smtClean="0"/>
-              <a:t>8/9/2014</a:t>
+              <a:t>2/1/2015</a:t>
             </a:fld>
             <a:endParaRPr lang="en-US"/>
           </a:p>
@@ -9813,7 +9813,7 @@
           <a:p>
             <a:fld id="{D2B62928-2648-4210-B25C-2BD7B5FE2C7B}" type="datetimeFigureOut">
               <a:rPr lang="en-US" smtClean="0"/>
-              <a:t>8/9/2014</a:t>
+              <a:t>2/1/2015</a:t>
             </a:fld>
             <a:endParaRPr lang="en-US"/>
           </a:p>
@@ -24740,7 +24740,7 @@
 </file>
 
 <file path=ppt/slides/slide3.xml><?xml version="1.0" encoding="utf-8"?>
-<p:sld xmlns:a="http://schemas.openxmlformats.org/drawingml/2006/main" xmlns:r="http://schemas.openxmlformats.org/officeDocument/2006/relationships" xmlns:p="http://schemas.openxmlformats.org/presentationml/2006/main" show="0">
+<p:sld xmlns:a="http://schemas.openxmlformats.org/drawingml/2006/main" xmlns:r="http://schemas.openxmlformats.org/officeDocument/2006/relationships" xmlns:p="http://schemas.openxmlformats.org/presentationml/2006/main">
   <p:cSld>
     <p:spTree>
       <p:nvGrpSpPr>

</xml_diff>